<commit_message>
week-1 week-2 course notes are updated, week-1 shortcut links are added and week-2 broken links are fixed.
</commit_message>
<xml_diff>
--- a/docs/week-2-setup/ce103-week-2-setup.en.md_word.pptx
+++ b/docs/week-2-setup/ce103-week-2-setup.en.md_word.pptx
@@ -15250,12 +15250,17 @@
             </a:r>
           </a:p>
           <a:p>
-            <a:pPr lvl="0" indent="0" marL="0">
-              <a:buNone/>
-            </a:pPr>
+            <a:pPr lvl="0"/>
             <a:r>
               <a:rPr/>
               <a:t>http://www.flowgorithm.org/</a:t>
+            </a:r>
+          </a:p>
+          <a:p>
+            <a:pPr lvl="0"/>
+            <a:r>
+              <a:rPr/>
+              <a:t>https://github.com/timoteoponce/flowgorithm-examples</a:t>
             </a:r>
           </a:p>
         </p:txBody>
@@ -16269,6 +16274,10 @@
                 <a:hlinkClick r:id="rId2"/>
               </a:rPr>
               <a:t>Download MinGW-w64 - for 32 and 64 bit Windows from SourceForge.net</a:t>
+            </a:r>
+            <a:r>
+              <a:rPr/>
+              <a:t> - If you have problem try github builds - https://github.com/niXman/mingw-builds-binaries/releases - https://github.com/niXman/mingw-builds-binaries/releases/download/12.2.0-rt_v10-rev0/x86_64-12.2.0-release-win32-seh-rt_v10-rev0.7z</a:t>
             </a:r>
           </a:p>
           <a:p>

</xml_diff>